<commit_message>
BMW 2011 revised version
</commit_message>
<xml_diff>
--- a/07_Locator/07_Locator.pptx
+++ b/07_Locator/07_Locator.pptx
@@ -399,6 +399,11 @@
         </p:txBody>
       </p:sp>
     </p:spTree>
+    <p:extLst>
+      <p:ext uri="{BB962C8B-B14F-4D97-AF65-F5344CB8AC3E}">
+        <p14:creationId xmlns:p14="http://schemas.microsoft.com/office/powerpoint/2010/main" val="1705391385"/>
+      </p:ext>
+    </p:extLst>
   </p:cSld>
   <p:clrMap bg1="lt1" tx1="dk1" bg2="lt2" tx2="dk2" accent1="accent1" accent2="accent2" accent3="accent3" accent4="accent4" accent5="accent5" accent6="accent6" hlink="hlink" folHlink="folHlink"/>
 </p:handoutMaster>
@@ -721,6 +726,11 @@
         </p:txBody>
       </p:sp>
     </p:spTree>
+    <p:extLst>
+      <p:ext uri="{BB962C8B-B14F-4D97-AF65-F5344CB8AC3E}">
+        <p14:creationId xmlns:p14="http://schemas.microsoft.com/office/powerpoint/2010/main" val="3308276479"/>
+      </p:ext>
+    </p:extLst>
   </p:cSld>
   <p:clrMap bg1="lt1" tx1="dk1" bg2="lt2" tx2="dk2" accent1="accent1" accent2="accent2" accent3="accent3" accent4="accent4" accent5="accent5" accent6="accent6" hlink="hlink" folHlink="folHlink"/>
   <p:notesStyle>
@@ -8514,7 +8524,23 @@
                   <a:srgbClr val="595959"/>
                 </a:solidFill>
               </a:rPr>
-              <a:t>© 2009 Autodesk </a:t>
+              <a:t>© </a:t>
+            </a:r>
+            <a:r>
+              <a:rPr lang="en-US" sz="800" dirty="0" smtClean="0">
+                <a:solidFill>
+                  <a:srgbClr val="595959"/>
+                </a:solidFill>
+              </a:rPr>
+              <a:t>2012 </a:t>
+            </a:r>
+            <a:r>
+              <a:rPr lang="en-US" sz="800" dirty="0">
+                <a:solidFill>
+                  <a:srgbClr val="595959"/>
+                </a:solidFill>
+              </a:rPr>
+              <a:t>Autodesk </a:t>
             </a:r>
           </a:p>
         </p:txBody>
@@ -24147,7 +24173,6 @@
               <a:rPr lang="en-US" dirty="0" smtClean="0"/>
               <a:t>Example: helixTool.py</a:t>
             </a:r>
-            <a:endParaRPr lang="en-US" dirty="0" smtClean="0"/>
           </a:p>
         </p:txBody>
       </p:sp>
@@ -24626,13 +24651,8 @@
           <a:p>
             <a:r>
               <a:rPr lang="en-US" dirty="0" smtClean="0"/>
-              <a:t>Example: </a:t>
-            </a:r>
-            <a:r>
-              <a:rPr lang="en-US" dirty="0" smtClean="0"/>
-              <a:t>helixTool.py</a:t>
-            </a:r>
-            <a:endParaRPr lang="en-US" dirty="0" smtClean="0"/>
+              <a:t>Example: helixTool.py</a:t>
+            </a:r>
           </a:p>
         </p:txBody>
       </p:sp>
@@ -25603,7 +25623,6 @@
               <a:rPr lang="en-US" dirty="0" smtClean="0"/>
               <a:t>Example: helixTool.py</a:t>
             </a:r>
-            <a:endParaRPr lang="en-US" dirty="0" smtClean="0"/>
           </a:p>
         </p:txBody>
       </p:sp>
@@ -26463,7 +26482,6 @@
               <a:rPr lang="en-US" dirty="0" smtClean="0"/>
               <a:t>Example: helixTool.py</a:t>
             </a:r>
-            <a:endParaRPr lang="en-US" dirty="0" smtClean="0"/>
           </a:p>
         </p:txBody>
       </p:sp>
@@ -28262,7 +28280,6 @@
               <a:rPr lang="en-US" dirty="0" smtClean="0"/>
               <a:t>Example: helixTool.py</a:t>
             </a:r>
-            <a:endParaRPr lang="en-US" dirty="0" smtClean="0"/>
           </a:p>
         </p:txBody>
       </p:sp>

</xml_diff>